<commit_message>
Emilie's slides for presentation3 uploaded
</commit_message>
<xml_diff>
--- a/ECG_presentation3.pptx
+++ b/ECG_presentation3.pptx
@@ -15,6 +15,10 @@
     <p:sldId id="260" r:id="rId9"/>
     <p:sldId id="266" r:id="rId10"/>
     <p:sldId id="267" r:id="rId11"/>
+    <p:sldId id="268" r:id="rId12"/>
+    <p:sldId id="269" r:id="rId13"/>
+    <p:sldId id="270" r:id="rId14"/>
+    <p:sldId id="271" r:id="rId15"/>
   </p:sldIdLst>
   <p:sldSz cx="9144000" cy="6858000" type="screen4x3"/>
   <p:notesSz cx="6858000" cy="9144000"/>
@@ -5323,6 +5327,1194 @@
 </p:sld>
 </file>
 
+<file path=ppt/slides/slide11.xml><?xml version="1.0" encoding="utf-8"?>
+<p:sld xmlns:a="http://schemas.openxmlformats.org/drawingml/2006/main" xmlns:r="http://schemas.openxmlformats.org/officeDocument/2006/relationships" xmlns:p="http://schemas.openxmlformats.org/presentationml/2006/main">
+  <p:cSld>
+    <p:spTree>
+      <p:nvGrpSpPr>
+        <p:cNvPr id="1" name=""/>
+        <p:cNvGrpSpPr/>
+        <p:nvPr/>
+      </p:nvGrpSpPr>
+      <p:grpSpPr>
+        <a:xfrm>
+          <a:off x="0" y="0"/>
+          <a:ext cx="0" cy="0"/>
+          <a:chOff x="0" y="0"/>
+          <a:chExt cx="0" cy="0"/>
+        </a:xfrm>
+      </p:grpSpPr>
+      <p:sp>
+        <p:nvSpPr>
+          <p:cNvPr id="2" name="Titre 1"/>
+          <p:cNvSpPr>
+            <a:spLocks noGrp="1"/>
+          </p:cNvSpPr>
+          <p:nvPr>
+            <p:ph type="title"/>
+          </p:nvPr>
+        </p:nvSpPr>
+        <p:spPr/>
+        <p:txBody>
+          <a:bodyPr/>
+          <a:lstStyle/>
+          <a:p>
+            <a:r>
+              <a:rPr lang="fr-FR" dirty="0" smtClean="0"/>
+              <a:t>Baseline KNN model</a:t>
+            </a:r>
+            <a:endParaRPr lang="fr-FR" dirty="0"/>
+          </a:p>
+        </p:txBody>
+      </p:sp>
+      <p:sp>
+        <p:nvSpPr>
+          <p:cNvPr id="3" name="Espace réservé du contenu 2"/>
+          <p:cNvSpPr>
+            <a:spLocks noGrp="1"/>
+          </p:cNvSpPr>
+          <p:nvPr>
+            <p:ph sz="quarter" idx="1"/>
+          </p:nvPr>
+        </p:nvSpPr>
+        <p:spPr/>
+        <p:txBody>
+          <a:bodyPr>
+            <a:normAutofit/>
+          </a:bodyPr>
+          <a:lstStyle/>
+          <a:p>
+            <a:r>
+              <a:rPr lang="fr-FR" dirty="0" smtClean="0"/>
+              <a:t>Conclusions:</a:t>
+            </a:r>
+          </a:p>
+          <a:p>
+            <a:pPr lvl="1">
+              <a:buNone/>
+            </a:pPr>
+            <a:r>
+              <a:rPr lang="fr-FR" dirty="0" smtClean="0"/>
+              <a:t> </a:t>
+            </a:r>
+          </a:p>
+          <a:p>
+            <a:pPr lvl="1"/>
+            <a:r>
+              <a:rPr lang="fr-FR" dirty="0" err="1" smtClean="0"/>
+              <a:t>We</a:t>
+            </a:r>
+            <a:r>
+              <a:rPr lang="fr-FR" dirty="0" smtClean="0"/>
+              <a:t> </a:t>
+            </a:r>
+            <a:r>
+              <a:rPr lang="fr-FR" dirty="0" err="1" smtClean="0"/>
+              <a:t>might</a:t>
+            </a:r>
+            <a:r>
+              <a:rPr lang="fr-FR" dirty="0" smtClean="0"/>
+              <a:t> have issues due to </a:t>
+            </a:r>
+            <a:r>
+              <a:rPr lang="fr-FR" dirty="0" err="1" smtClean="0"/>
+              <a:t>imbalanced</a:t>
+            </a:r>
+            <a:r>
+              <a:rPr lang="fr-FR" dirty="0" smtClean="0"/>
+              <a:t> </a:t>
+            </a:r>
+            <a:r>
+              <a:rPr lang="fr-FR" dirty="0" err="1" smtClean="0"/>
+              <a:t>datasets</a:t>
+            </a:r>
+            <a:endParaRPr lang="fr-FR" dirty="0" smtClean="0"/>
+          </a:p>
+          <a:p>
+            <a:pPr lvl="1"/>
+            <a:endParaRPr lang="fr-FR" dirty="0" smtClean="0"/>
+          </a:p>
+          <a:p>
+            <a:pPr lvl="1"/>
+            <a:r>
+              <a:rPr lang="fr-FR" dirty="0" smtClean="0"/>
+              <a:t>The new </a:t>
+            </a:r>
+            <a:r>
+              <a:rPr lang="fr-FR" dirty="0" err="1" smtClean="0"/>
+              <a:t>features</a:t>
+            </a:r>
+            <a:r>
+              <a:rPr lang="fr-FR" dirty="0" smtClean="0"/>
+              <a:t> </a:t>
+            </a:r>
+            <a:r>
+              <a:rPr lang="fr-FR" dirty="0" err="1" smtClean="0"/>
+              <a:t>that</a:t>
+            </a:r>
+            <a:r>
+              <a:rPr lang="fr-FR" dirty="0" smtClean="0"/>
+              <a:t> have been </a:t>
+            </a:r>
+            <a:r>
+              <a:rPr lang="fr-FR" dirty="0" err="1" smtClean="0"/>
+              <a:t>tested</a:t>
+            </a:r>
+            <a:r>
+              <a:rPr lang="fr-FR" dirty="0" smtClean="0"/>
+              <a:t> </a:t>
+            </a:r>
+            <a:r>
+              <a:rPr lang="fr-FR" dirty="0" err="1" smtClean="0"/>
+              <a:t>don’t</a:t>
+            </a:r>
+            <a:r>
+              <a:rPr lang="fr-FR" dirty="0" smtClean="0"/>
+              <a:t> </a:t>
+            </a:r>
+            <a:r>
+              <a:rPr lang="fr-FR" dirty="0" err="1" smtClean="0"/>
+              <a:t>seem</a:t>
+            </a:r>
+            <a:r>
+              <a:rPr lang="fr-FR" dirty="0" smtClean="0"/>
+              <a:t> relevant</a:t>
+            </a:r>
+            <a:endParaRPr lang="fr-FR" dirty="0"/>
+          </a:p>
+        </p:txBody>
+      </p:sp>
+    </p:spTree>
+  </p:cSld>
+  <p:clrMapOvr>
+    <a:masterClrMapping/>
+  </p:clrMapOvr>
+  <p:timing>
+    <p:tnLst>
+      <p:par>
+        <p:cTn id="1" dur="indefinite" restart="never" nodeType="tmRoot"/>
+      </p:par>
+    </p:tnLst>
+  </p:timing>
+</p:sld>
+</file>
+
+<file path=ppt/slides/slide12.xml><?xml version="1.0" encoding="utf-8"?>
+<p:sld xmlns:a="http://schemas.openxmlformats.org/drawingml/2006/main" xmlns:r="http://schemas.openxmlformats.org/officeDocument/2006/relationships" xmlns:p="http://schemas.openxmlformats.org/presentationml/2006/main">
+  <p:cSld>
+    <p:spTree>
+      <p:nvGrpSpPr>
+        <p:cNvPr id="1" name=""/>
+        <p:cNvGrpSpPr/>
+        <p:nvPr/>
+      </p:nvGrpSpPr>
+      <p:grpSpPr>
+        <a:xfrm>
+          <a:off x="0" y="0"/>
+          <a:ext cx="0" cy="0"/>
+          <a:chOff x="0" y="0"/>
+          <a:chExt cx="0" cy="0"/>
+        </a:xfrm>
+      </p:grpSpPr>
+      <p:sp>
+        <p:nvSpPr>
+          <p:cNvPr id="2" name="Titre 1"/>
+          <p:cNvSpPr>
+            <a:spLocks noGrp="1"/>
+          </p:cNvSpPr>
+          <p:nvPr>
+            <p:ph type="title"/>
+          </p:nvPr>
+        </p:nvSpPr>
+        <p:spPr/>
+        <p:txBody>
+          <a:bodyPr/>
+          <a:lstStyle/>
+          <a:p>
+            <a:r>
+              <a:rPr lang="fr-FR" dirty="0" smtClean="0"/>
+              <a:t>Baseline KNN model</a:t>
+            </a:r>
+            <a:endParaRPr lang="fr-FR" dirty="0"/>
+          </a:p>
+        </p:txBody>
+      </p:sp>
+      <p:sp>
+        <p:nvSpPr>
+          <p:cNvPr id="3" name="Espace réservé du contenu 2"/>
+          <p:cNvSpPr>
+            <a:spLocks noGrp="1"/>
+          </p:cNvSpPr>
+          <p:nvPr>
+            <p:ph sz="quarter" idx="1"/>
+          </p:nvPr>
+        </p:nvSpPr>
+        <p:spPr/>
+        <p:txBody>
+          <a:bodyPr/>
+          <a:lstStyle/>
+          <a:p>
+            <a:r>
+              <a:rPr lang="fr-FR" dirty="0" err="1" smtClean="0"/>
+              <a:t>Dealing</a:t>
+            </a:r>
+            <a:r>
+              <a:rPr lang="fr-FR" dirty="0" smtClean="0"/>
+              <a:t> </a:t>
+            </a:r>
+            <a:r>
+              <a:rPr lang="fr-FR" dirty="0" err="1" smtClean="0"/>
+              <a:t>with</a:t>
+            </a:r>
+            <a:r>
+              <a:rPr lang="fr-FR" dirty="0" smtClean="0"/>
+              <a:t> an </a:t>
+            </a:r>
+            <a:r>
+              <a:rPr lang="fr-FR" dirty="0" err="1" smtClean="0"/>
+              <a:t>unbalanced</a:t>
+            </a:r>
+            <a:r>
+              <a:rPr lang="fr-FR" dirty="0" smtClean="0"/>
+              <a:t> </a:t>
+            </a:r>
+            <a:r>
+              <a:rPr lang="fr-FR" dirty="0" err="1" smtClean="0"/>
+              <a:t>dataset</a:t>
+            </a:r>
+            <a:r>
+              <a:rPr lang="fr-FR" dirty="0" smtClean="0"/>
+              <a:t>…</a:t>
+            </a:r>
+          </a:p>
+          <a:p>
+            <a:pPr lvl="4">
+              <a:buNone/>
+            </a:pPr>
+            <a:endParaRPr lang="fr-FR" dirty="0" smtClean="0"/>
+          </a:p>
+          <a:p>
+            <a:pPr lvl="1"/>
+            <a:r>
+              <a:rPr lang="fr-FR" dirty="0" smtClean="0"/>
+              <a:t>Initial split: </a:t>
+            </a:r>
+            <a:r>
+              <a:rPr lang="fr-FR" dirty="0" smtClean="0">
+                <a:solidFill>
+                  <a:srgbClr val="00B050"/>
+                </a:solidFill>
+              </a:rPr>
+              <a:t>72 471</a:t>
+            </a:r>
+            <a:r>
+              <a:rPr lang="fr-FR" dirty="0" smtClean="0"/>
+              <a:t>, </a:t>
+            </a:r>
+            <a:r>
+              <a:rPr lang="fr-FR" dirty="0" smtClean="0">
+                <a:solidFill>
+                  <a:schemeClr val="accent1"/>
+                </a:solidFill>
+              </a:rPr>
+              <a:t>2 223</a:t>
+            </a:r>
+            <a:r>
+              <a:rPr lang="fr-FR" dirty="0" smtClean="0"/>
+              <a:t>, </a:t>
+            </a:r>
+            <a:r>
+              <a:rPr lang="fr-FR" dirty="0" smtClean="0">
+                <a:solidFill>
+                  <a:srgbClr val="FFC000"/>
+                </a:solidFill>
+              </a:rPr>
+              <a:t>5 788</a:t>
+            </a:r>
+            <a:r>
+              <a:rPr lang="fr-FR" dirty="0" smtClean="0"/>
+              <a:t>, </a:t>
+            </a:r>
+            <a:r>
+              <a:rPr lang="fr-FR" dirty="0" smtClean="0">
+                <a:solidFill>
+                  <a:srgbClr val="FF0000"/>
+                </a:solidFill>
+              </a:rPr>
+              <a:t>641</a:t>
+            </a:r>
+            <a:r>
+              <a:rPr lang="fr-FR" dirty="0" smtClean="0"/>
+              <a:t>, </a:t>
+            </a:r>
+            <a:r>
+              <a:rPr lang="fr-FR" dirty="0" smtClean="0">
+                <a:solidFill>
+                  <a:srgbClr val="FFC000"/>
+                </a:solidFill>
+              </a:rPr>
+              <a:t>6 431</a:t>
+            </a:r>
+            <a:r>
+              <a:rPr lang="fr-FR" dirty="0" smtClean="0"/>
+              <a:t/>
+            </a:r>
+            <a:br>
+              <a:rPr lang="fr-FR" dirty="0" smtClean="0"/>
+            </a:br>
+            <a:r>
+              <a:rPr lang="fr-FR" dirty="0" smtClean="0"/>
+              <a:t>Initial </a:t>
+            </a:r>
+            <a:r>
+              <a:rPr lang="fr-FR" dirty="0" err="1" smtClean="0"/>
+              <a:t>recalls</a:t>
+            </a:r>
+            <a:r>
+              <a:rPr lang="fr-FR" dirty="0" smtClean="0"/>
+              <a:t>: 99.6%, </a:t>
+            </a:r>
+            <a:r>
+              <a:rPr lang="fr-FR" b="1" dirty="0" smtClean="0"/>
+              <a:t>69.1%</a:t>
+            </a:r>
+            <a:r>
+              <a:rPr lang="fr-FR" dirty="0" smtClean="0"/>
+              <a:t>, 92.6%, </a:t>
+            </a:r>
+            <a:r>
+              <a:rPr lang="fr-FR" b="1" dirty="0" smtClean="0"/>
+              <a:t>70.2%</a:t>
+            </a:r>
+            <a:r>
+              <a:rPr lang="fr-FR" dirty="0" smtClean="0"/>
+              <a:t>,</a:t>
+            </a:r>
+            <a:r>
+              <a:rPr lang="fr-FR" b="1" dirty="0" smtClean="0"/>
+              <a:t> </a:t>
+            </a:r>
+            <a:r>
+              <a:rPr lang="fr-FR" dirty="0" smtClean="0"/>
+              <a:t>96.2%</a:t>
+            </a:r>
+          </a:p>
+          <a:p>
+            <a:pPr lvl="1"/>
+            <a:endParaRPr lang="fr-FR" dirty="0" smtClean="0"/>
+          </a:p>
+          <a:p>
+            <a:pPr lvl="1">
+              <a:buFont typeface="Wingdings"/>
+              <a:buChar char="à"/>
+            </a:pPr>
+            <a:r>
+              <a:rPr lang="fr-FR" dirty="0" err="1" smtClean="0">
+                <a:sym typeface="Wingdings" pitchFamily="2" charset="2"/>
+              </a:rPr>
+              <a:t>Undersample</a:t>
+            </a:r>
+            <a:r>
+              <a:rPr lang="fr-FR" dirty="0" smtClean="0">
+                <a:sym typeface="Wingdings" pitchFamily="2" charset="2"/>
+              </a:rPr>
+              <a:t> the </a:t>
+            </a:r>
+            <a:r>
+              <a:rPr lang="fr-FR" dirty="0" err="1" smtClean="0">
+                <a:sym typeface="Wingdings" pitchFamily="2" charset="2"/>
+              </a:rPr>
+              <a:t>majority</a:t>
+            </a:r>
+            <a:r>
+              <a:rPr lang="fr-FR" dirty="0" smtClean="0">
+                <a:sym typeface="Wingdings" pitchFamily="2" charset="2"/>
+              </a:rPr>
+              <a:t> class</a:t>
+            </a:r>
+          </a:p>
+          <a:p>
+            <a:pPr lvl="1">
+              <a:buFont typeface="Wingdings"/>
+              <a:buChar char="à"/>
+            </a:pPr>
+            <a:r>
+              <a:rPr lang="fr-FR" dirty="0" err="1" smtClean="0">
+                <a:sym typeface="Wingdings" pitchFamily="2" charset="2"/>
+              </a:rPr>
+              <a:t>Oversample</a:t>
+            </a:r>
+            <a:r>
+              <a:rPr lang="fr-FR" dirty="0" smtClean="0">
+                <a:sym typeface="Wingdings" pitchFamily="2" charset="2"/>
+              </a:rPr>
+              <a:t> the 2 </a:t>
+            </a:r>
+            <a:r>
+              <a:rPr lang="fr-FR" dirty="0" err="1" smtClean="0">
+                <a:sym typeface="Wingdings" pitchFamily="2" charset="2"/>
+              </a:rPr>
+              <a:t>smallest</a:t>
+            </a:r>
+            <a:r>
+              <a:rPr lang="fr-FR" dirty="0" smtClean="0">
+                <a:sym typeface="Wingdings" pitchFamily="2" charset="2"/>
+              </a:rPr>
+              <a:t> </a:t>
+            </a:r>
+            <a:r>
+              <a:rPr lang="fr-FR" dirty="0" err="1" smtClean="0">
+                <a:sym typeface="Wingdings" pitchFamily="2" charset="2"/>
+              </a:rPr>
+              <a:t>minority</a:t>
+            </a:r>
+            <a:r>
+              <a:rPr lang="fr-FR" dirty="0" smtClean="0">
+                <a:sym typeface="Wingdings" pitchFamily="2" charset="2"/>
+              </a:rPr>
+              <a:t> classes (duplicates)</a:t>
+            </a:r>
+          </a:p>
+          <a:p>
+            <a:pPr lvl="1">
+              <a:buFont typeface="Wingdings"/>
+              <a:buChar char="à"/>
+            </a:pPr>
+            <a:endParaRPr lang="fr-FR" dirty="0" smtClean="0">
+              <a:sym typeface="Wingdings" pitchFamily="2" charset="2"/>
+            </a:endParaRPr>
+          </a:p>
+          <a:p>
+            <a:pPr lvl="1"/>
+            <a:r>
+              <a:rPr lang="fr-FR" dirty="0" smtClean="0">
+                <a:sym typeface="Wingdings" pitchFamily="2" charset="2"/>
+              </a:rPr>
+              <a:t>New split: </a:t>
+            </a:r>
+            <a:r>
+              <a:rPr lang="fr-FR" b="1" dirty="0" smtClean="0">
+                <a:sym typeface="Wingdings" pitchFamily="2" charset="2"/>
+              </a:rPr>
+              <a:t>50 000</a:t>
+            </a:r>
+            <a:r>
+              <a:rPr lang="fr-FR" dirty="0" smtClean="0">
+                <a:sym typeface="Wingdings" pitchFamily="2" charset="2"/>
+              </a:rPr>
+              <a:t>, </a:t>
+            </a:r>
+            <a:r>
+              <a:rPr lang="fr-FR" b="1" dirty="0" smtClean="0">
+                <a:sym typeface="Wingdings" pitchFamily="2" charset="2"/>
+              </a:rPr>
+              <a:t>4 000</a:t>
+            </a:r>
+            <a:r>
+              <a:rPr lang="fr-FR" dirty="0" smtClean="0">
+                <a:sym typeface="Wingdings" pitchFamily="2" charset="2"/>
+              </a:rPr>
+              <a:t>, 5 788, </a:t>
+            </a:r>
+            <a:r>
+              <a:rPr lang="fr-FR" b="1" dirty="0" smtClean="0">
+                <a:sym typeface="Wingdings" pitchFamily="2" charset="2"/>
+              </a:rPr>
+              <a:t>2 000</a:t>
+            </a:r>
+            <a:r>
+              <a:rPr lang="fr-FR" dirty="0" smtClean="0">
+                <a:sym typeface="Wingdings" pitchFamily="2" charset="2"/>
+              </a:rPr>
+              <a:t>, 6 431</a:t>
+            </a:r>
+            <a:br>
+              <a:rPr lang="fr-FR" dirty="0" smtClean="0">
+                <a:sym typeface="Wingdings" pitchFamily="2" charset="2"/>
+              </a:rPr>
+            </a:br>
+            <a:r>
+              <a:rPr lang="fr-FR" dirty="0" smtClean="0">
+                <a:sym typeface="Wingdings" pitchFamily="2" charset="2"/>
+              </a:rPr>
+              <a:t>New </a:t>
+            </a:r>
+            <a:r>
+              <a:rPr lang="fr-FR" dirty="0" err="1" smtClean="0">
+                <a:sym typeface="Wingdings" pitchFamily="2" charset="2"/>
+              </a:rPr>
+              <a:t>recalls</a:t>
+            </a:r>
+            <a:r>
+              <a:rPr lang="fr-FR" dirty="0" smtClean="0">
+                <a:sym typeface="Wingdings" pitchFamily="2" charset="2"/>
+              </a:rPr>
+              <a:t>: 98.9%, </a:t>
+            </a:r>
+            <a:r>
+              <a:rPr lang="fr-FR" b="1" dirty="0" smtClean="0">
+                <a:sym typeface="Wingdings" pitchFamily="2" charset="2"/>
+              </a:rPr>
+              <a:t>80.4%</a:t>
+            </a:r>
+            <a:r>
+              <a:rPr lang="fr-FR" dirty="0" smtClean="0">
+                <a:sym typeface="Wingdings" pitchFamily="2" charset="2"/>
+              </a:rPr>
+              <a:t>, 91.3%, </a:t>
+            </a:r>
+            <a:r>
+              <a:rPr lang="fr-FR" b="1" dirty="0" smtClean="0">
+                <a:sym typeface="Wingdings" pitchFamily="2" charset="2"/>
+              </a:rPr>
+              <a:t>89.2%</a:t>
+            </a:r>
+            <a:r>
+              <a:rPr lang="fr-FR" dirty="0" smtClean="0">
+                <a:sym typeface="Wingdings" pitchFamily="2" charset="2"/>
+              </a:rPr>
+              <a:t>, 96.5%</a:t>
+            </a:r>
+          </a:p>
+        </p:txBody>
+      </p:sp>
+    </p:spTree>
+  </p:cSld>
+  <p:clrMapOvr>
+    <a:masterClrMapping/>
+  </p:clrMapOvr>
+</p:sld>
+</file>
+
+<file path=ppt/slides/slide13.xml><?xml version="1.0" encoding="utf-8"?>
+<p:sld xmlns:a="http://schemas.openxmlformats.org/drawingml/2006/main" xmlns:r="http://schemas.openxmlformats.org/officeDocument/2006/relationships" xmlns:p="http://schemas.openxmlformats.org/presentationml/2006/main">
+  <p:cSld>
+    <p:spTree>
+      <p:nvGrpSpPr>
+        <p:cNvPr id="1" name=""/>
+        <p:cNvGrpSpPr/>
+        <p:nvPr/>
+      </p:nvGrpSpPr>
+      <p:grpSpPr>
+        <a:xfrm>
+          <a:off x="0" y="0"/>
+          <a:ext cx="0" cy="0"/>
+          <a:chOff x="0" y="0"/>
+          <a:chExt cx="0" cy="0"/>
+        </a:xfrm>
+      </p:grpSpPr>
+      <p:sp>
+        <p:nvSpPr>
+          <p:cNvPr id="2" name="Titre 1"/>
+          <p:cNvSpPr>
+            <a:spLocks noGrp="1"/>
+          </p:cNvSpPr>
+          <p:nvPr>
+            <p:ph type="title"/>
+          </p:nvPr>
+        </p:nvSpPr>
+        <p:spPr/>
+        <p:txBody>
+          <a:bodyPr/>
+          <a:lstStyle/>
+          <a:p>
+            <a:r>
+              <a:rPr lang="fr-FR" dirty="0" smtClean="0"/>
+              <a:t>Baseline KNN model</a:t>
+            </a:r>
+            <a:endParaRPr lang="fr-FR" dirty="0"/>
+          </a:p>
+        </p:txBody>
+      </p:sp>
+      <p:sp>
+        <p:nvSpPr>
+          <p:cNvPr id="3" name="Espace réservé du contenu 2"/>
+          <p:cNvSpPr>
+            <a:spLocks noGrp="1"/>
+          </p:cNvSpPr>
+          <p:nvPr>
+            <p:ph sz="quarter" idx="1"/>
+          </p:nvPr>
+        </p:nvSpPr>
+        <p:spPr/>
+        <p:txBody>
+          <a:bodyPr/>
+          <a:lstStyle/>
+          <a:p>
+            <a:r>
+              <a:rPr lang="fr-FR" dirty="0" err="1" smtClean="0"/>
+              <a:t>Dealing</a:t>
+            </a:r>
+            <a:r>
+              <a:rPr lang="fr-FR" dirty="0" smtClean="0"/>
+              <a:t> </a:t>
+            </a:r>
+            <a:r>
+              <a:rPr lang="fr-FR" dirty="0" err="1" smtClean="0"/>
+              <a:t>with</a:t>
+            </a:r>
+            <a:r>
+              <a:rPr lang="fr-FR" dirty="0" smtClean="0"/>
+              <a:t> an </a:t>
+            </a:r>
+            <a:r>
+              <a:rPr lang="fr-FR" dirty="0" err="1" smtClean="0"/>
+              <a:t>unbalanced</a:t>
+            </a:r>
+            <a:r>
+              <a:rPr lang="fr-FR" dirty="0" smtClean="0"/>
+              <a:t> </a:t>
+            </a:r>
+            <a:r>
+              <a:rPr lang="fr-FR" dirty="0" err="1" smtClean="0"/>
+              <a:t>dataset</a:t>
+            </a:r>
+            <a:r>
+              <a:rPr lang="fr-FR" dirty="0" smtClean="0"/>
+              <a:t>…</a:t>
+            </a:r>
+          </a:p>
+          <a:p>
+            <a:pPr lvl="4">
+              <a:buNone/>
+            </a:pPr>
+            <a:endParaRPr lang="fr-FR" dirty="0" smtClean="0"/>
+          </a:p>
+          <a:p>
+            <a:pPr lvl="1"/>
+            <a:r>
+              <a:rPr lang="fr-FR" dirty="0" smtClean="0"/>
+              <a:t>Initial split: </a:t>
+            </a:r>
+            <a:r>
+              <a:rPr lang="fr-FR" dirty="0" smtClean="0">
+                <a:solidFill>
+                  <a:srgbClr val="00B050"/>
+                </a:solidFill>
+              </a:rPr>
+              <a:t>72 471</a:t>
+            </a:r>
+            <a:r>
+              <a:rPr lang="fr-FR" dirty="0" smtClean="0"/>
+              <a:t>, </a:t>
+            </a:r>
+            <a:r>
+              <a:rPr lang="fr-FR" dirty="0" smtClean="0">
+                <a:solidFill>
+                  <a:schemeClr val="accent1"/>
+                </a:solidFill>
+              </a:rPr>
+              <a:t>2 223</a:t>
+            </a:r>
+            <a:r>
+              <a:rPr lang="fr-FR" dirty="0" smtClean="0"/>
+              <a:t>, </a:t>
+            </a:r>
+            <a:r>
+              <a:rPr lang="fr-FR" dirty="0" smtClean="0">
+                <a:solidFill>
+                  <a:srgbClr val="FFC000"/>
+                </a:solidFill>
+              </a:rPr>
+              <a:t>5 788</a:t>
+            </a:r>
+            <a:r>
+              <a:rPr lang="fr-FR" dirty="0" smtClean="0"/>
+              <a:t>, </a:t>
+            </a:r>
+            <a:r>
+              <a:rPr lang="fr-FR" dirty="0" smtClean="0">
+                <a:solidFill>
+                  <a:srgbClr val="FF0000"/>
+                </a:solidFill>
+              </a:rPr>
+              <a:t>641</a:t>
+            </a:r>
+            <a:r>
+              <a:rPr lang="fr-FR" dirty="0" smtClean="0"/>
+              <a:t>, </a:t>
+            </a:r>
+            <a:r>
+              <a:rPr lang="fr-FR" dirty="0" smtClean="0">
+                <a:solidFill>
+                  <a:srgbClr val="FFC000"/>
+                </a:solidFill>
+              </a:rPr>
+              <a:t>6 431</a:t>
+            </a:r>
+            <a:r>
+              <a:rPr lang="fr-FR" dirty="0" smtClean="0"/>
+              <a:t/>
+            </a:r>
+            <a:br>
+              <a:rPr lang="fr-FR" dirty="0" smtClean="0"/>
+            </a:br>
+            <a:r>
+              <a:rPr lang="fr-FR" dirty="0" smtClean="0"/>
+              <a:t>Initial </a:t>
+            </a:r>
+            <a:r>
+              <a:rPr lang="fr-FR" dirty="0" err="1" smtClean="0"/>
+              <a:t>recalls</a:t>
+            </a:r>
+            <a:r>
+              <a:rPr lang="fr-FR" dirty="0" smtClean="0"/>
+              <a:t>: 99.6%, </a:t>
+            </a:r>
+            <a:r>
+              <a:rPr lang="fr-FR" b="1" dirty="0" smtClean="0"/>
+              <a:t>69.1%</a:t>
+            </a:r>
+            <a:r>
+              <a:rPr lang="fr-FR" dirty="0" smtClean="0"/>
+              <a:t>, 92.6%, </a:t>
+            </a:r>
+            <a:r>
+              <a:rPr lang="fr-FR" b="1" dirty="0" smtClean="0"/>
+              <a:t>70.2%</a:t>
+            </a:r>
+            <a:r>
+              <a:rPr lang="fr-FR" dirty="0" smtClean="0"/>
+              <a:t>,</a:t>
+            </a:r>
+            <a:r>
+              <a:rPr lang="fr-FR" b="1" dirty="0" smtClean="0"/>
+              <a:t> </a:t>
+            </a:r>
+            <a:r>
+              <a:rPr lang="fr-FR" dirty="0" smtClean="0"/>
+              <a:t>96.2%</a:t>
+            </a:r>
+          </a:p>
+          <a:p>
+            <a:pPr lvl="1"/>
+            <a:endParaRPr lang="fr-FR" dirty="0" smtClean="0"/>
+          </a:p>
+          <a:p>
+            <a:pPr lvl="1">
+              <a:buFont typeface="Wingdings"/>
+              <a:buChar char="à"/>
+            </a:pPr>
+            <a:r>
+              <a:rPr lang="fr-FR" dirty="0" err="1" smtClean="0">
+                <a:sym typeface="Wingdings" pitchFamily="2" charset="2"/>
+              </a:rPr>
+              <a:t>Undersample</a:t>
+            </a:r>
+            <a:r>
+              <a:rPr lang="fr-FR" dirty="0" smtClean="0">
+                <a:sym typeface="Wingdings" pitchFamily="2" charset="2"/>
+              </a:rPr>
+              <a:t> the </a:t>
+            </a:r>
+            <a:r>
+              <a:rPr lang="fr-FR" dirty="0" err="1" smtClean="0">
+                <a:sym typeface="Wingdings" pitchFamily="2" charset="2"/>
+              </a:rPr>
+              <a:t>majority</a:t>
+            </a:r>
+            <a:r>
+              <a:rPr lang="fr-FR" dirty="0" smtClean="0">
+                <a:sym typeface="Wingdings" pitchFamily="2" charset="2"/>
+              </a:rPr>
+              <a:t> class</a:t>
+            </a:r>
+          </a:p>
+          <a:p>
+            <a:pPr lvl="1">
+              <a:buFont typeface="Wingdings"/>
+              <a:buChar char="à"/>
+            </a:pPr>
+            <a:r>
+              <a:rPr lang="fr-FR" dirty="0" err="1" smtClean="0">
+                <a:sym typeface="Wingdings" pitchFamily="2" charset="2"/>
+              </a:rPr>
+              <a:t>Oversample</a:t>
+            </a:r>
+            <a:r>
+              <a:rPr lang="fr-FR" dirty="0" smtClean="0">
+                <a:sym typeface="Wingdings" pitchFamily="2" charset="2"/>
+              </a:rPr>
+              <a:t> the 2 </a:t>
+            </a:r>
+            <a:r>
+              <a:rPr lang="fr-FR" dirty="0" err="1" smtClean="0">
+                <a:sym typeface="Wingdings" pitchFamily="2" charset="2"/>
+              </a:rPr>
+              <a:t>smallest</a:t>
+            </a:r>
+            <a:r>
+              <a:rPr lang="fr-FR" dirty="0" smtClean="0">
+                <a:sym typeface="Wingdings" pitchFamily="2" charset="2"/>
+              </a:rPr>
+              <a:t> </a:t>
+            </a:r>
+            <a:r>
+              <a:rPr lang="fr-FR" dirty="0" err="1" smtClean="0">
+                <a:sym typeface="Wingdings" pitchFamily="2" charset="2"/>
+              </a:rPr>
+              <a:t>minority</a:t>
+            </a:r>
+            <a:r>
+              <a:rPr lang="fr-FR" dirty="0" smtClean="0">
+                <a:sym typeface="Wingdings" pitchFamily="2" charset="2"/>
+              </a:rPr>
+              <a:t> classes (duplicates)</a:t>
+            </a:r>
+          </a:p>
+          <a:p>
+            <a:pPr lvl="1">
+              <a:buFont typeface="Wingdings"/>
+              <a:buChar char="à"/>
+            </a:pPr>
+            <a:endParaRPr lang="fr-FR" dirty="0" smtClean="0">
+              <a:sym typeface="Wingdings" pitchFamily="2" charset="2"/>
+            </a:endParaRPr>
+          </a:p>
+          <a:p>
+            <a:pPr lvl="1"/>
+            <a:r>
+              <a:rPr lang="fr-FR" dirty="0" smtClean="0">
+                <a:sym typeface="Wingdings" pitchFamily="2" charset="2"/>
+              </a:rPr>
+              <a:t>New split: </a:t>
+            </a:r>
+            <a:r>
+              <a:rPr lang="fr-FR" b="1" dirty="0" smtClean="0">
+                <a:sym typeface="Wingdings" pitchFamily="2" charset="2"/>
+              </a:rPr>
+              <a:t>50 000</a:t>
+            </a:r>
+            <a:r>
+              <a:rPr lang="fr-FR" dirty="0" smtClean="0">
+                <a:sym typeface="Wingdings" pitchFamily="2" charset="2"/>
+              </a:rPr>
+              <a:t>, </a:t>
+            </a:r>
+            <a:r>
+              <a:rPr lang="fr-FR" b="1" dirty="0" smtClean="0">
+                <a:sym typeface="Wingdings" pitchFamily="2" charset="2"/>
+              </a:rPr>
+              <a:t>4 000</a:t>
+            </a:r>
+            <a:r>
+              <a:rPr lang="fr-FR" dirty="0" smtClean="0">
+                <a:sym typeface="Wingdings" pitchFamily="2" charset="2"/>
+              </a:rPr>
+              <a:t>, 5 788, </a:t>
+            </a:r>
+            <a:r>
+              <a:rPr lang="fr-FR" b="1" dirty="0" smtClean="0">
+                <a:sym typeface="Wingdings" pitchFamily="2" charset="2"/>
+              </a:rPr>
+              <a:t>2 000</a:t>
+            </a:r>
+            <a:r>
+              <a:rPr lang="fr-FR" dirty="0" smtClean="0">
+                <a:sym typeface="Wingdings" pitchFamily="2" charset="2"/>
+              </a:rPr>
+              <a:t>, 6 431</a:t>
+            </a:r>
+            <a:br>
+              <a:rPr lang="fr-FR" dirty="0" smtClean="0">
+                <a:sym typeface="Wingdings" pitchFamily="2" charset="2"/>
+              </a:rPr>
+            </a:br>
+            <a:r>
+              <a:rPr lang="fr-FR" dirty="0" smtClean="0">
+                <a:sym typeface="Wingdings" pitchFamily="2" charset="2"/>
+              </a:rPr>
+              <a:t>New </a:t>
+            </a:r>
+            <a:r>
+              <a:rPr lang="fr-FR" dirty="0" err="1" smtClean="0">
+                <a:sym typeface="Wingdings" pitchFamily="2" charset="2"/>
+              </a:rPr>
+              <a:t>recalls</a:t>
+            </a:r>
+            <a:r>
+              <a:rPr lang="fr-FR" dirty="0" smtClean="0">
+                <a:sym typeface="Wingdings" pitchFamily="2" charset="2"/>
+              </a:rPr>
+              <a:t>: 98.9%, </a:t>
+            </a:r>
+            <a:r>
+              <a:rPr lang="fr-FR" b="1" dirty="0" smtClean="0">
+                <a:sym typeface="Wingdings" pitchFamily="2" charset="2"/>
+              </a:rPr>
+              <a:t>80.4%</a:t>
+            </a:r>
+            <a:r>
+              <a:rPr lang="fr-FR" dirty="0" smtClean="0">
+                <a:sym typeface="Wingdings" pitchFamily="2" charset="2"/>
+              </a:rPr>
+              <a:t>, 91.3%, </a:t>
+            </a:r>
+            <a:r>
+              <a:rPr lang="fr-FR" b="1" dirty="0" smtClean="0">
+                <a:sym typeface="Wingdings" pitchFamily="2" charset="2"/>
+              </a:rPr>
+              <a:t>89.2%</a:t>
+            </a:r>
+            <a:r>
+              <a:rPr lang="fr-FR" dirty="0" smtClean="0">
+                <a:sym typeface="Wingdings" pitchFamily="2" charset="2"/>
+              </a:rPr>
+              <a:t>, 96.5%</a:t>
+            </a:r>
+          </a:p>
+        </p:txBody>
+      </p:sp>
+      <p:pic>
+        <p:nvPicPr>
+          <p:cNvPr id="4" name="Picture 1" descr="C:\Users\user\AppData\Local\Microsoft\Windows\Temporary Internet Files\Content.IE5\P1JSXYE9\check-mark-1292787_640[1].png"/>
+          <p:cNvPicPr>
+            <a:picLocks noChangeAspect="1" noChangeArrowheads="1"/>
+          </p:cNvPicPr>
+          <p:nvPr/>
+        </p:nvPicPr>
+        <p:blipFill>
+          <a:blip r:embed="rId2" cstate="print"/>
+          <a:srcRect/>
+          <a:stretch>
+            <a:fillRect/>
+          </a:stretch>
+        </p:blipFill>
+        <p:spPr bwMode="auto">
+          <a:xfrm>
+            <a:off x="6876256" y="5301208"/>
+            <a:ext cx="1008112" cy="989208"/>
+          </a:xfrm>
+          <a:prstGeom prst="rect">
+            <a:avLst/>
+          </a:prstGeom>
+          <a:noFill/>
+        </p:spPr>
+      </p:pic>
+    </p:spTree>
+  </p:cSld>
+  <p:clrMapOvr>
+    <a:masterClrMapping/>
+  </p:clrMapOvr>
+</p:sld>
+</file>
+
+<file path=ppt/slides/slide14.xml><?xml version="1.0" encoding="utf-8"?>
+<p:sld xmlns:a="http://schemas.openxmlformats.org/drawingml/2006/main" xmlns:r="http://schemas.openxmlformats.org/officeDocument/2006/relationships" xmlns:p="http://schemas.openxmlformats.org/presentationml/2006/main">
+  <p:cSld>
+    <p:spTree>
+      <p:nvGrpSpPr>
+        <p:cNvPr id="1" name=""/>
+        <p:cNvGrpSpPr/>
+        <p:nvPr/>
+      </p:nvGrpSpPr>
+      <p:grpSpPr>
+        <a:xfrm>
+          <a:off x="0" y="0"/>
+          <a:ext cx="0" cy="0"/>
+          <a:chOff x="0" y="0"/>
+          <a:chExt cx="0" cy="0"/>
+        </a:xfrm>
+      </p:grpSpPr>
+      <p:sp>
+        <p:nvSpPr>
+          <p:cNvPr id="2" name="Titre 1"/>
+          <p:cNvSpPr>
+            <a:spLocks noGrp="1"/>
+          </p:cNvSpPr>
+          <p:nvPr>
+            <p:ph type="title"/>
+          </p:nvPr>
+        </p:nvSpPr>
+        <p:spPr/>
+        <p:txBody>
+          <a:bodyPr/>
+          <a:lstStyle/>
+          <a:p>
+            <a:r>
+              <a:rPr lang="fr-FR" dirty="0" err="1" smtClean="0"/>
+              <a:t>Dealing</a:t>
+            </a:r>
+            <a:r>
+              <a:rPr lang="fr-FR" dirty="0" smtClean="0"/>
+              <a:t> </a:t>
+            </a:r>
+            <a:r>
+              <a:rPr lang="fr-FR" dirty="0" err="1" smtClean="0"/>
+              <a:t>with</a:t>
+            </a:r>
+            <a:r>
+              <a:rPr lang="fr-FR" dirty="0" smtClean="0"/>
+              <a:t> </a:t>
+            </a:r>
+            <a:r>
+              <a:rPr lang="fr-FR" dirty="0" err="1" smtClean="0"/>
+              <a:t>minority</a:t>
+            </a:r>
+            <a:r>
+              <a:rPr lang="fr-FR" dirty="0" smtClean="0"/>
+              <a:t> classes</a:t>
+            </a:r>
+            <a:endParaRPr lang="fr-FR" dirty="0"/>
+          </a:p>
+        </p:txBody>
+      </p:sp>
+      <p:sp>
+        <p:nvSpPr>
+          <p:cNvPr id="3" name="Espace réservé du contenu 2"/>
+          <p:cNvSpPr>
+            <a:spLocks noGrp="1"/>
+          </p:cNvSpPr>
+          <p:nvPr>
+            <p:ph sz="quarter" idx="1"/>
+          </p:nvPr>
+        </p:nvSpPr>
+        <p:spPr/>
+        <p:txBody>
+          <a:bodyPr/>
+          <a:lstStyle/>
+          <a:p>
+            <a:r>
+              <a:rPr lang="fr-FR" dirty="0" err="1" smtClean="0"/>
+              <a:t>Already</a:t>
+            </a:r>
+            <a:r>
+              <a:rPr lang="fr-FR" dirty="0" smtClean="0"/>
+              <a:t> </a:t>
+            </a:r>
+            <a:r>
+              <a:rPr lang="fr-FR" dirty="0" err="1" smtClean="0"/>
+              <a:t>done</a:t>
+            </a:r>
+            <a:r>
+              <a:rPr lang="fr-FR" dirty="0" smtClean="0"/>
+              <a:t>:</a:t>
+            </a:r>
+          </a:p>
+          <a:p>
+            <a:pPr lvl="1"/>
+            <a:r>
+              <a:rPr lang="fr-FR" dirty="0" smtClean="0"/>
+              <a:t>Duplicate </a:t>
+            </a:r>
+            <a:r>
+              <a:rPr lang="fr-FR" dirty="0" err="1" smtClean="0"/>
+              <a:t>samples</a:t>
+            </a:r>
+            <a:r>
+              <a:rPr lang="fr-FR" dirty="0" smtClean="0"/>
+              <a:t> </a:t>
+            </a:r>
+            <a:r>
+              <a:rPr lang="fr-FR" dirty="0" err="1" smtClean="0"/>
+              <a:t>with</a:t>
+            </a:r>
+            <a:r>
+              <a:rPr lang="fr-FR" dirty="0" smtClean="0"/>
+              <a:t> replacement</a:t>
+            </a:r>
+          </a:p>
+          <a:p>
+            <a:pPr lvl="1"/>
+            <a:endParaRPr lang="fr-FR" dirty="0" smtClean="0"/>
+          </a:p>
+          <a:p>
+            <a:r>
+              <a:rPr lang="fr-FR" dirty="0" err="1" smtClean="0"/>
+              <a:t>Other</a:t>
+            </a:r>
+            <a:r>
+              <a:rPr lang="fr-FR" dirty="0" smtClean="0"/>
+              <a:t> </a:t>
+            </a:r>
+            <a:r>
+              <a:rPr lang="fr-FR" dirty="0" err="1" smtClean="0"/>
+              <a:t>leads</a:t>
+            </a:r>
+            <a:r>
+              <a:rPr lang="fr-FR" dirty="0" smtClean="0"/>
+              <a:t>:</a:t>
+            </a:r>
+          </a:p>
+          <a:p>
+            <a:pPr lvl="1"/>
+            <a:r>
+              <a:rPr lang="fr-FR" dirty="0" err="1" smtClean="0"/>
+              <a:t>Add</a:t>
+            </a:r>
+            <a:r>
+              <a:rPr lang="fr-FR" dirty="0" smtClean="0"/>
+              <a:t> </a:t>
+            </a:r>
+            <a:r>
+              <a:rPr lang="fr-FR" dirty="0" err="1" smtClean="0"/>
+              <a:t>small</a:t>
+            </a:r>
+            <a:r>
+              <a:rPr lang="fr-FR" dirty="0" smtClean="0"/>
+              <a:t> white noise</a:t>
+            </a:r>
+          </a:p>
+          <a:p>
+            <a:pPr lvl="1"/>
+            <a:r>
+              <a:rPr lang="fr-FR" dirty="0" err="1" smtClean="0"/>
+              <a:t>Add</a:t>
+            </a:r>
+            <a:r>
+              <a:rPr lang="fr-FR" dirty="0" smtClean="0"/>
+              <a:t> </a:t>
+            </a:r>
+            <a:r>
+              <a:rPr lang="fr-FR" dirty="0" err="1" smtClean="0"/>
+              <a:t>delay</a:t>
+            </a:r>
+            <a:r>
+              <a:rPr lang="fr-FR" dirty="0" smtClean="0"/>
+              <a:t> in the temporal signal</a:t>
+            </a:r>
+          </a:p>
+          <a:p>
+            <a:pPr lvl="1"/>
+            <a:r>
+              <a:rPr lang="fr-FR" dirty="0" smtClean="0"/>
+              <a:t>SMOTE (</a:t>
+            </a:r>
+            <a:r>
+              <a:rPr lang="fr-FR" dirty="0" err="1" smtClean="0"/>
+              <a:t>interpolating</a:t>
+            </a:r>
+            <a:r>
+              <a:rPr lang="fr-FR" dirty="0" smtClean="0"/>
+              <a:t> </a:t>
+            </a:r>
+            <a:r>
+              <a:rPr lang="fr-FR" dirty="0" err="1" smtClean="0"/>
+              <a:t>between</a:t>
+            </a:r>
+            <a:r>
+              <a:rPr lang="fr-FR" dirty="0" smtClean="0"/>
+              <a:t> </a:t>
+            </a:r>
+            <a:r>
+              <a:rPr lang="fr-FR" dirty="0" err="1" smtClean="0"/>
+              <a:t>neighbors</a:t>
+            </a:r>
+            <a:r>
+              <a:rPr lang="fr-FR" dirty="0" smtClean="0"/>
+              <a:t>)</a:t>
+            </a:r>
+          </a:p>
+        </p:txBody>
+      </p:sp>
+    </p:spTree>
+  </p:cSld>
+  <p:clrMapOvr>
+    <a:masterClrMapping/>
+  </p:clrMapOvr>
+</p:sld>
+</file>
+
 <file path=ppt/slides/slide2.xml><?xml version="1.0" encoding="utf-8"?>
 <p:sld xmlns:a="http://schemas.openxmlformats.org/drawingml/2006/main" xmlns:r="http://schemas.openxmlformats.org/officeDocument/2006/relationships" xmlns:p="http://schemas.openxmlformats.org/presentationml/2006/main">
   <p:cSld>
@@ -7631,7 +8823,16 @@
           <a:p>
             <a:r>
               <a:rPr lang="fr-FR" dirty="0" smtClean="0"/>
-              <a:t>Conclusion: </a:t>
+              <a:t>Conclusions:</a:t>
+            </a:r>
+          </a:p>
+          <a:p>
+            <a:pPr lvl="1">
+              <a:buNone/>
+            </a:pPr>
+            <a:r>
+              <a:rPr lang="fr-FR" dirty="0" smtClean="0"/>
+              <a:t> </a:t>
             </a:r>
           </a:p>
           <a:p>

</xml_diff>